<commit_message>
INCLASS ASSIGNMENT ON OOP
</commit_message>
<xml_diff>
--- a/AbbaAli-ConcernAA1.pptx
+++ b/AbbaAli-ConcernAA1.pptx
@@ -279,7 +279,7 @@
           <a:p>
             <a:fld id="{147E333F-B91C-48AA-A5D6-CF0810E30668}" type="datetimeFigureOut">
               <a:rPr lang="en-NG" smtClean="0"/>
-              <a:t>24 Apr 2021</a:t>
+              <a:t>29 Apr 2021</a:t>
             </a:fld>
             <a:endParaRPr lang="en-NG"/>
           </a:p>
@@ -479,7 +479,7 @@
           <a:p>
             <a:fld id="{147E333F-B91C-48AA-A5D6-CF0810E30668}" type="datetimeFigureOut">
               <a:rPr lang="en-NG" smtClean="0"/>
-              <a:t>24 Apr 2021</a:t>
+              <a:t>29 Apr 2021</a:t>
             </a:fld>
             <a:endParaRPr lang="en-NG"/>
           </a:p>
@@ -689,7 +689,7 @@
           <a:p>
             <a:fld id="{147E333F-B91C-48AA-A5D6-CF0810E30668}" type="datetimeFigureOut">
               <a:rPr lang="en-NG" smtClean="0"/>
-              <a:t>24 Apr 2021</a:t>
+              <a:t>29 Apr 2021</a:t>
             </a:fld>
             <a:endParaRPr lang="en-NG"/>
           </a:p>
@@ -889,7 +889,7 @@
           <a:p>
             <a:fld id="{147E333F-B91C-48AA-A5D6-CF0810E30668}" type="datetimeFigureOut">
               <a:rPr lang="en-NG" smtClean="0"/>
-              <a:t>24 Apr 2021</a:t>
+              <a:t>29 Apr 2021</a:t>
             </a:fld>
             <a:endParaRPr lang="en-NG"/>
           </a:p>
@@ -1165,7 +1165,7 @@
           <a:p>
             <a:fld id="{147E333F-B91C-48AA-A5D6-CF0810E30668}" type="datetimeFigureOut">
               <a:rPr lang="en-NG" smtClean="0"/>
-              <a:t>24 Apr 2021</a:t>
+              <a:t>29 Apr 2021</a:t>
             </a:fld>
             <a:endParaRPr lang="en-NG"/>
           </a:p>
@@ -1433,7 +1433,7 @@
           <a:p>
             <a:fld id="{147E333F-B91C-48AA-A5D6-CF0810E30668}" type="datetimeFigureOut">
               <a:rPr lang="en-NG" smtClean="0"/>
-              <a:t>24 Apr 2021</a:t>
+              <a:t>29 Apr 2021</a:t>
             </a:fld>
             <a:endParaRPr lang="en-NG"/>
           </a:p>
@@ -1848,7 +1848,7 @@
           <a:p>
             <a:fld id="{147E333F-B91C-48AA-A5D6-CF0810E30668}" type="datetimeFigureOut">
               <a:rPr lang="en-NG" smtClean="0"/>
-              <a:t>24 Apr 2021</a:t>
+              <a:t>29 Apr 2021</a:t>
             </a:fld>
             <a:endParaRPr lang="en-NG"/>
           </a:p>
@@ -1990,7 +1990,7 @@
           <a:p>
             <a:fld id="{147E333F-B91C-48AA-A5D6-CF0810E30668}" type="datetimeFigureOut">
               <a:rPr lang="en-NG" smtClean="0"/>
-              <a:t>24 Apr 2021</a:t>
+              <a:t>29 Apr 2021</a:t>
             </a:fld>
             <a:endParaRPr lang="en-NG"/>
           </a:p>
@@ -2103,7 +2103,7 @@
           <a:p>
             <a:fld id="{147E333F-B91C-48AA-A5D6-CF0810E30668}" type="datetimeFigureOut">
               <a:rPr lang="en-NG" smtClean="0"/>
-              <a:t>24 Apr 2021</a:t>
+              <a:t>29 Apr 2021</a:t>
             </a:fld>
             <a:endParaRPr lang="en-NG"/>
           </a:p>
@@ -2416,7 +2416,7 @@
           <a:p>
             <a:fld id="{147E333F-B91C-48AA-A5D6-CF0810E30668}" type="datetimeFigureOut">
               <a:rPr lang="en-NG" smtClean="0"/>
-              <a:t>24 Apr 2021</a:t>
+              <a:t>29 Apr 2021</a:t>
             </a:fld>
             <a:endParaRPr lang="en-NG"/>
           </a:p>
@@ -2705,7 +2705,7 @@
           <a:p>
             <a:fld id="{147E333F-B91C-48AA-A5D6-CF0810E30668}" type="datetimeFigureOut">
               <a:rPr lang="en-NG" smtClean="0"/>
-              <a:t>24 Apr 2021</a:t>
+              <a:t>29 Apr 2021</a:t>
             </a:fld>
             <a:endParaRPr lang="en-NG"/>
           </a:p>
@@ -2948,7 +2948,7 @@
           <a:p>
             <a:fld id="{147E333F-B91C-48AA-A5D6-CF0810E30668}" type="datetimeFigureOut">
               <a:rPr lang="en-NG" smtClean="0"/>
-              <a:t>24 Apr 2021</a:t>
+              <a:t>29 Apr 2021</a:t>
             </a:fld>
             <a:endParaRPr lang="en-NG"/>
           </a:p>
@@ -9214,8 +9214,8 @@
           </a:p>
         </p:txBody>
       </p:sp>
-      <mc:AlternateContent xmlns:mc="http://schemas.openxmlformats.org/markup-compatibility/2006">
-        <mc:Choice xmlns:a14="http://schemas.microsoft.com/office/drawing/2010/main" Requires="a14">
+      <mc:AlternateContent xmlns:mc="http://schemas.openxmlformats.org/markup-compatibility/2006" xmlns:a14="http://schemas.microsoft.com/office/drawing/2010/main">
+        <mc:Choice Requires="a14">
           <p:sp>
             <p:nvSpPr>
               <p:cNvPr id="11" name="Rectangle 10">
@@ -9499,7 +9499,7 @@
             </p:txBody>
           </p:sp>
         </mc:Choice>
-        <mc:Fallback>
+        <mc:Fallback xmlns="">
           <p:sp>
             <p:nvSpPr>
               <p:cNvPr id="11" name="Rectangle 10">
@@ -10038,8 +10038,17 @@
               <a:rPr lang="en-US" dirty="0">
                 <a:latin typeface="Bahnschrift SemiLight" panose="020B0502040204020203" pitchFamily="34" charset="0"/>
               </a:rPr>
-              <a:t> X = SQRT((B**2) - 4*A*C)</a:t>
-            </a:r>
+              <a:t> X </a:t>
+            </a:r>
+            <a:r>
+              <a:rPr lang="en-US">
+                <a:latin typeface="Bahnschrift SemiLight" panose="020B0502040204020203" pitchFamily="34" charset="0"/>
+              </a:rPr>
+              <a:t>= 	</a:t>
+            </a:r>
+            <a:endParaRPr lang="en-US" dirty="0">
+              <a:latin typeface="Bahnschrift SemiLight" panose="020B0502040204020203" pitchFamily="34" charset="0"/>
+            </a:endParaRPr>
           </a:p>
           <a:p>
             <a:pPr marL="0" indent="0">
@@ -10716,8 +10725,8 @@
           </a:p>
         </p:txBody>
       </p:sp>
-      <mc:AlternateContent xmlns:mc="http://schemas.openxmlformats.org/markup-compatibility/2006">
-        <mc:Choice xmlns:a14="http://schemas.microsoft.com/office/drawing/2010/main" Requires="a14">
+      <mc:AlternateContent xmlns:mc="http://schemas.openxmlformats.org/markup-compatibility/2006" xmlns:a14="http://schemas.microsoft.com/office/drawing/2010/main">
+        <mc:Choice Requires="a14">
           <p:sp>
             <p:nvSpPr>
               <p:cNvPr id="11" name="Rectangle 10">
@@ -10997,6 +11006,7 @@
                             <a:solidFill>
                               <a:schemeClr val="tx1"/>
                             </a:solidFill>
+                            <a:latin typeface="Cambria Math" panose="02040503050406030204" pitchFamily="18" charset="0"/>
                             <a:ea typeface="Cambria Math" panose="02040503050406030204" pitchFamily="18" charset="0"/>
                           </a:rPr>
                           <m:t>3</m:t>
@@ -11331,7 +11341,7 @@
             </p:txBody>
           </p:sp>
         </mc:Choice>
-        <mc:Fallback>
+        <mc:Fallback xmlns="">
           <p:sp>
             <p:nvSpPr>
               <p:cNvPr id="11" name="Rectangle 10">
@@ -11660,8 +11670,8 @@
           </a:fontRef>
         </p:style>
       </p:cxnSp>
-      <mc:AlternateContent xmlns:mc="http://schemas.openxmlformats.org/markup-compatibility/2006">
-        <mc:Choice xmlns:a14="http://schemas.microsoft.com/office/drawing/2010/main" Requires="a14">
+      <mc:AlternateContent xmlns:mc="http://schemas.openxmlformats.org/markup-compatibility/2006" xmlns:a14="http://schemas.microsoft.com/office/drawing/2010/main">
+        <mc:Choice Requires="a14">
           <p:sp>
             <p:nvSpPr>
               <p:cNvPr id="32" name="Rectangle 31">
@@ -12586,7 +12596,7 @@
             </p:txBody>
           </p:sp>
         </mc:Choice>
-        <mc:Fallback>
+        <mc:Fallback xmlns="">
           <p:sp>
             <p:nvSpPr>
               <p:cNvPr id="32" name="Rectangle 31">

</xml_diff>